<commit_message>
Add find example image
</commit_message>
<xml_diff>
--- a/docs/images/images_source.pptx
+++ b/docs/images/images_source.pptx
@@ -16,6 +16,7 @@
     <p:sldId id="265" r:id="rId10"/>
     <p:sldId id="266" r:id="rId11"/>
     <p:sldId id="267" r:id="rId12"/>
+    <p:sldId id="268" r:id="rId13"/>
   </p:sldIdLst>
   <p:sldSz cx="12192000" cy="6858000"/>
   <p:notesSz cx="6858000" cy="9144000"/>
@@ -4429,6 +4430,222 @@
 </p:sld>
 </file>
 
+<file path=ppt/slides/slide12.xml><?xml version="1.0" encoding="utf-8"?>
+<p:sld xmlns:a="http://schemas.openxmlformats.org/drawingml/2006/main" xmlns:r="http://schemas.openxmlformats.org/officeDocument/2006/relationships" xmlns:p="http://schemas.openxmlformats.org/presentationml/2006/main">
+  <p:cSld>
+    <p:spTree>
+      <p:nvGrpSpPr>
+        <p:cNvPr id="1" name=""/>
+        <p:cNvGrpSpPr/>
+        <p:nvPr/>
+      </p:nvGrpSpPr>
+      <p:grpSpPr>
+        <a:xfrm>
+          <a:off x="0" y="0"/>
+          <a:ext cx="0" cy="0"/>
+          <a:chOff x="0" y="0"/>
+          <a:chExt cx="0" cy="0"/>
+        </a:xfrm>
+      </p:grpSpPr>
+      <p:grpSp>
+        <p:nvGrpSpPr>
+          <p:cNvPr id="12" name="Group 11">
+            <a:extLst>
+              <a:ext uri="{FF2B5EF4-FFF2-40B4-BE49-F238E27FC236}">
+                <a16:creationId xmlns:a16="http://schemas.microsoft.com/office/drawing/2014/main" id="{A23406FC-9C52-9B89-0396-C6A8170AAD4A}"/>
+              </a:ext>
+            </a:extLst>
+          </p:cNvPr>
+          <p:cNvGrpSpPr/>
+          <p:nvPr/>
+        </p:nvGrpSpPr>
+        <p:grpSpPr>
+          <a:xfrm>
+            <a:off x="2884025" y="0"/>
+            <a:ext cx="6423949" cy="6858000"/>
+            <a:chOff x="2884025" y="0"/>
+            <a:chExt cx="6423949" cy="6858000"/>
+          </a:xfrm>
+        </p:grpSpPr>
+        <p:pic>
+          <p:nvPicPr>
+            <p:cNvPr id="3" name="Picture 2" descr="A screenshot of a computer&#10;&#10;Description automatically generated">
+              <a:extLst>
+                <a:ext uri="{FF2B5EF4-FFF2-40B4-BE49-F238E27FC236}">
+                  <a16:creationId xmlns:a16="http://schemas.microsoft.com/office/drawing/2014/main" id="{02612B76-2C27-A333-8552-21483021E325}"/>
+                </a:ext>
+              </a:extLst>
+            </p:cNvPr>
+            <p:cNvPicPr>
+              <a:picLocks noChangeAspect="1"/>
+            </p:cNvPicPr>
+            <p:nvPr/>
+          </p:nvPicPr>
+          <p:blipFill>
+            <a:blip r:embed="rId2">
+              <a:extLst>
+                <a:ext uri="{28A0092B-C50C-407E-A947-70E740481C1C}">
+                  <a14:useLocalDpi xmlns:a14="http://schemas.microsoft.com/office/drawing/2010/main" val="0"/>
+                </a:ext>
+              </a:extLst>
+            </a:blip>
+            <a:stretch>
+              <a:fillRect/>
+            </a:stretch>
+          </p:blipFill>
+          <p:spPr>
+            <a:xfrm>
+              <a:off x="2884025" y="0"/>
+              <a:ext cx="6423949" cy="6858000"/>
+            </a:xfrm>
+            <a:prstGeom prst="rect">
+              <a:avLst/>
+            </a:prstGeom>
+          </p:spPr>
+        </p:pic>
+        <p:cxnSp>
+          <p:nvCxnSpPr>
+            <p:cNvPr id="5" name="Straight Connector 4">
+              <a:extLst>
+                <a:ext uri="{FF2B5EF4-FFF2-40B4-BE49-F238E27FC236}">
+                  <a16:creationId xmlns:a16="http://schemas.microsoft.com/office/drawing/2014/main" id="{7BF89FED-027E-0A58-D3C9-5A034FAE7F38}"/>
+                </a:ext>
+              </a:extLst>
+            </p:cNvPr>
+            <p:cNvCxnSpPr>
+              <a:cxnSpLocks/>
+            </p:cNvCxnSpPr>
+            <p:nvPr/>
+          </p:nvCxnSpPr>
+          <p:spPr>
+            <a:xfrm>
+              <a:off x="3333750" y="1019175"/>
+              <a:ext cx="190500" cy="0"/>
+            </a:xfrm>
+            <a:prstGeom prst="line">
+              <a:avLst/>
+            </a:prstGeom>
+            <a:ln w="38100">
+              <a:solidFill>
+                <a:srgbClr val="FF0000"/>
+              </a:solidFill>
+            </a:ln>
+          </p:spPr>
+          <p:style>
+            <a:lnRef idx="2">
+              <a:schemeClr val="accent1"/>
+            </a:lnRef>
+            <a:fillRef idx="0">
+              <a:schemeClr val="accent1"/>
+            </a:fillRef>
+            <a:effectRef idx="1">
+              <a:schemeClr val="accent1"/>
+            </a:effectRef>
+            <a:fontRef idx="minor">
+              <a:schemeClr val="tx1"/>
+            </a:fontRef>
+          </p:style>
+        </p:cxnSp>
+        <p:cxnSp>
+          <p:nvCxnSpPr>
+            <p:cNvPr id="7" name="Straight Connector 6">
+              <a:extLst>
+                <a:ext uri="{FF2B5EF4-FFF2-40B4-BE49-F238E27FC236}">
+                  <a16:creationId xmlns:a16="http://schemas.microsoft.com/office/drawing/2014/main" id="{192B986B-CF7F-A3C2-E578-F8626D4748EA}"/>
+                </a:ext>
+              </a:extLst>
+            </p:cNvPr>
+            <p:cNvCxnSpPr>
+              <a:cxnSpLocks/>
+            </p:cNvCxnSpPr>
+            <p:nvPr/>
+          </p:nvCxnSpPr>
+          <p:spPr>
+            <a:xfrm>
+              <a:off x="3257550" y="2216150"/>
+              <a:ext cx="130175" cy="0"/>
+            </a:xfrm>
+            <a:prstGeom prst="line">
+              <a:avLst/>
+            </a:prstGeom>
+            <a:ln w="38100">
+              <a:solidFill>
+                <a:srgbClr val="FF0000"/>
+              </a:solidFill>
+            </a:ln>
+          </p:spPr>
+          <p:style>
+            <a:lnRef idx="2">
+              <a:schemeClr val="accent1"/>
+            </a:lnRef>
+            <a:fillRef idx="0">
+              <a:schemeClr val="accent1"/>
+            </a:fillRef>
+            <a:effectRef idx="1">
+              <a:schemeClr val="accent1"/>
+            </a:effectRef>
+            <a:fontRef idx="minor">
+              <a:schemeClr val="tx1"/>
+            </a:fontRef>
+          </p:style>
+        </p:cxnSp>
+        <p:cxnSp>
+          <p:nvCxnSpPr>
+            <p:cNvPr id="9" name="Straight Connector 8">
+              <a:extLst>
+                <a:ext uri="{FF2B5EF4-FFF2-40B4-BE49-F238E27FC236}">
+                  <a16:creationId xmlns:a16="http://schemas.microsoft.com/office/drawing/2014/main" id="{4ACA1831-E698-AFB4-F84B-DC8293E94E34}"/>
+                </a:ext>
+              </a:extLst>
+            </p:cNvPr>
+            <p:cNvCxnSpPr>
+              <a:cxnSpLocks/>
+            </p:cNvCxnSpPr>
+            <p:nvPr/>
+          </p:nvCxnSpPr>
+          <p:spPr>
+            <a:xfrm>
+              <a:off x="3305175" y="3292474"/>
+              <a:ext cx="111125" cy="0"/>
+            </a:xfrm>
+            <a:prstGeom prst="line">
+              <a:avLst/>
+            </a:prstGeom>
+            <a:ln w="38100">
+              <a:solidFill>
+                <a:srgbClr val="FF0000"/>
+              </a:solidFill>
+            </a:ln>
+          </p:spPr>
+          <p:style>
+            <a:lnRef idx="2">
+              <a:schemeClr val="accent1"/>
+            </a:lnRef>
+            <a:fillRef idx="0">
+              <a:schemeClr val="accent1"/>
+            </a:fillRef>
+            <a:effectRef idx="1">
+              <a:schemeClr val="accent1"/>
+            </a:effectRef>
+            <a:fontRef idx="minor">
+              <a:schemeClr val="tx1"/>
+            </a:fontRef>
+          </p:style>
+        </p:cxnSp>
+      </p:grpSp>
+    </p:spTree>
+    <p:extLst>
+      <p:ext uri="{BB962C8B-B14F-4D97-AF65-F5344CB8AC3E}">
+        <p14:creationId xmlns:p14="http://schemas.microsoft.com/office/powerpoint/2010/main" val="3112529941"/>
+      </p:ext>
+    </p:extLst>
+  </p:cSld>
+  <p:clrMapOvr>
+    <a:masterClrMapping/>
+  </p:clrMapOvr>
+</p:sld>
+</file>
+
 <file path=ppt/slides/slide2.xml><?xml version="1.0" encoding="utf-8"?>
 <p:sld xmlns:a="http://schemas.openxmlformats.org/drawingml/2006/main" xmlns:r="http://schemas.openxmlformats.org/officeDocument/2006/relationships" xmlns:p="http://schemas.openxmlformats.org/presentationml/2006/main">
   <p:cSld>

</xml_diff>